<commit_message>
Tweaked presentation and class diagram
</commit_message>
<xml_diff>
--- a/PowerPoint/Team #4 -- ROCKETMAN.pptx
+++ b/PowerPoint/Team #4 -- ROCKETMAN.pptx
@@ -6776,7 +6776,7 @@
         </p:blipFill>
         <p:spPr>
           <a:xfrm>
-            <a:off x="2337025" y="627750"/>
+            <a:off x="2648725" y="572700"/>
             <a:ext cx="3846561" cy="4266000"/>
           </a:xfrm>
           <a:prstGeom prst="rect">
@@ -7858,7 +7858,7 @@
         <p:spPr>
           <a:xfrm>
             <a:off x="0" y="0"/>
-            <a:ext cx="9143997" cy="5143498"/>
+            <a:ext cx="9144003" cy="5143499"/>
           </a:xfrm>
           <a:prstGeom prst="rect">
             <a:avLst/>
@@ -7903,7 +7903,7 @@
               <a:buNone/>
             </a:pPr>
             <a:r>
-              <a:rPr lang="en" sz="1920" u="sng">
+              <a:rPr lang="en" sz="1620" u="sng">
                 <a:solidFill>
                   <a:schemeClr val="hlink"/>
                 </a:solidFill>
@@ -7911,7 +7911,7 @@
               </a:rPr>
               <a:t>Example – [Final] Class Diagram</a:t>
             </a:r>
-            <a:endParaRPr sz="1920"/>
+            <a:endParaRPr sz="1620"/>
           </a:p>
         </p:txBody>
       </p:sp>
@@ -7973,7 +7973,12 @@
               <a:buNone/>
             </a:pPr>
             <a:r>
-              <a:rPr lang="en"/>
+              <a:rPr lang="en" u="sng">
+                <a:solidFill>
+                  <a:schemeClr val="hlink"/>
+                </a:solidFill>
+                <a:hlinkClick r:id="rId3"/>
+              </a:rPr>
               <a:t>!!! TIME FOR THE GAME DEMO !!!</a:t>
             </a:r>
             <a:endParaRPr/>

</xml_diff>

<commit_message>
last change to the presentation i swear
</commit_message>
<xml_diff>
--- a/PowerPoint/Team #4 -- ROCKETMAN.pptx
+++ b/PowerPoint/Team #4 -- ROCKETMAN.pptx
@@ -884,136 +884,7 @@
               <a:buNone/>
             </a:pPr>
             <a:r>
-              <a:rPr lang="en"/>
-              <a:t>tests imports “server” </a:t>
-            </a:r>
-            <a:endParaRPr/>
-          </a:p>
-          <a:p>
-            <a:pPr indent="0" lvl="0" marL="0" rtl="0" algn="l">
-              <a:spcBef>
-                <a:spcPts val="0"/>
-              </a:spcBef>
-              <a:spcAft>
-                <a:spcPts val="0"/>
-              </a:spcAft>
-              <a:buNone/>
-            </a:pPr>
-            <a:r>
-              <a:rPr lang="en"/>
-              <a:t>controller imports: “server”, “menu_panels”, “menu_utilities”, “game”, and “data”</a:t>
-            </a:r>
-            <a:endParaRPr/>
-          </a:p>
-          <a:p>
-            <a:pPr indent="0" lvl="0" marL="0" rtl="0" algn="l">
-              <a:spcBef>
-                <a:spcPts val="0"/>
-              </a:spcBef>
-              <a:spcAft>
-                <a:spcPts val="0"/>
-              </a:spcAft>
-              <a:buNone/>
-            </a:pPr>
-            <a:r>
-              <a:rPr lang="en"/>
-              <a:t>data imports “game_utilities”</a:t>
-            </a:r>
-            <a:endParaRPr/>
-          </a:p>
-          <a:p>
-            <a:pPr indent="0" lvl="0" marL="0" rtl="0" algn="l">
-              <a:spcBef>
-                <a:spcPts val="0"/>
-              </a:spcBef>
-              <a:spcAft>
-                <a:spcPts val="0"/>
-              </a:spcAft>
-              <a:buNone/>
-            </a:pPr>
-            <a:r>
-              <a:rPr lang="en"/>
-              <a:t>game imports “controller”, “data”, “menu_panels”, and “server” </a:t>
-            </a:r>
-            <a:endParaRPr/>
-          </a:p>
-          <a:p>
-            <a:pPr indent="0" lvl="0" marL="0" rtl="0" algn="l">
-              <a:spcBef>
-                <a:spcPts val="0"/>
-              </a:spcBef>
-              <a:spcAft>
-                <a:spcPts val="0"/>
-              </a:spcAft>
-              <a:buNone/>
-            </a:pPr>
-            <a:r>
-              <a:rPr lang="en"/>
-              <a:t>game_utilities imports “server_utilities” and “data” </a:t>
-            </a:r>
-            <a:endParaRPr/>
-          </a:p>
-          <a:p>
-            <a:pPr indent="0" lvl="0" marL="0" rtl="0" algn="l">
-              <a:spcBef>
-                <a:spcPts val="0"/>
-              </a:spcBef>
-              <a:spcAft>
-                <a:spcPts val="0"/>
-              </a:spcAft>
-              <a:buNone/>
-            </a:pPr>
-            <a:r>
-              <a:rPr lang="en"/>
-              <a:t>menu_panels imports “menu_utilities”, “game_utilities”, “server”, “server_utilities”, and “data” </a:t>
-            </a:r>
-            <a:endParaRPr/>
-          </a:p>
-          <a:p>
-            <a:pPr indent="0" lvl="0" marL="0" rtl="0" algn="l">
-              <a:spcBef>
-                <a:spcPts val="0"/>
-              </a:spcBef>
-              <a:spcAft>
-                <a:spcPts val="0"/>
-              </a:spcAft>
-              <a:buNone/>
-            </a:pPr>
-            <a:r>
-              <a:rPr lang="en"/>
-              <a:t>menu_utilities imports “game_utilities”, “data” </a:t>
-            </a:r>
-            <a:endParaRPr/>
-          </a:p>
-          <a:p>
-            <a:pPr indent="0" lvl="0" marL="0" rtl="0" algn="l">
-              <a:spcBef>
-                <a:spcPts val="0"/>
-              </a:spcBef>
-              <a:spcAft>
-                <a:spcPts val="0"/>
-              </a:spcAft>
-              <a:buNone/>
-            </a:pPr>
-            <a:r>
-              <a:rPr lang="en"/>
-              <a:t>server imports “controller”, “data” , “game_utilities”, and “server_utilities” </a:t>
-            </a:r>
-            <a:endParaRPr/>
-          </a:p>
-          <a:p>
-            <a:pPr indent="0" lvl="0" marL="0" rtl="0" algn="l">
-              <a:spcBef>
-                <a:spcPts val="0"/>
-              </a:spcBef>
-              <a:spcAft>
-                <a:spcPts val="0"/>
-              </a:spcAft>
-              <a:buNone/>
-            </a:pPr>
-            <a:r>
-              <a:rPr lang="en"/>
-              <a:t>server_utilities imports “data”, “game_utilities”, “menu_utilities”, “server”</a:t>
+              <a:t/>
             </a:r>
             <a:endParaRPr/>
           </a:p>
@@ -1032,7 +903,7 @@
   <p:cSld>
     <p:spTree>
       <p:nvGrpSpPr>
-        <p:cNvPr id="65" name="Shape 65"/>
+        <p:cNvPr id="64" name="Shape 64"/>
         <p:cNvGrpSpPr/>
         <p:nvPr/>
       </p:nvGrpSpPr>
@@ -1046,7 +917,7 @@
       </p:grpSpPr>
       <p:sp>
         <p:nvSpPr>
-          <p:cNvPr id="66" name="Google Shape;66;g26ebb36c761_0_5:notes"/>
+          <p:cNvPr id="65" name="Google Shape;65;g26ebb36c761_0_5:notes"/>
           <p:cNvSpPr/>
           <p:nvPr>
             <p:ph idx="2" type="sldImg"/>
@@ -1081,7 +952,7 @@
       </p:sp>
       <p:sp>
         <p:nvSpPr>
-          <p:cNvPr id="67" name="Google Shape;67;g26ebb36c761_0_5:notes"/>
+          <p:cNvPr id="66" name="Google Shape;66;g26ebb36c761_0_5:notes"/>
           <p:cNvSpPr txBox="1"/>
           <p:nvPr>
             <p:ph idx="1" type="body"/>
@@ -1131,7 +1002,7 @@
   <p:cSld>
     <p:spTree>
       <p:nvGrpSpPr>
-        <p:cNvPr id="71" name="Shape 71"/>
+        <p:cNvPr id="70" name="Shape 70"/>
         <p:cNvGrpSpPr/>
         <p:nvPr/>
       </p:nvGrpSpPr>
@@ -1145,7 +1016,7 @@
       </p:grpSpPr>
       <p:sp>
         <p:nvSpPr>
-          <p:cNvPr id="72" name="Google Shape;72;g26ebb36c761_0_10:notes"/>
+          <p:cNvPr id="71" name="Google Shape;71;g26ebb36c761_0_10:notes"/>
           <p:cNvSpPr/>
           <p:nvPr>
             <p:ph idx="2" type="sldImg"/>
@@ -1180,7 +1051,7 @@
       </p:sp>
       <p:sp>
         <p:nvSpPr>
-          <p:cNvPr id="73" name="Google Shape;73;g26ebb36c761_0_10:notes"/>
+          <p:cNvPr id="72" name="Google Shape;72;g26ebb36c761_0_10:notes"/>
           <p:cNvSpPr txBox="1"/>
           <p:nvPr>
             <p:ph idx="1" type="body"/>
@@ -1230,7 +1101,7 @@
   <p:cSld>
     <p:spTree>
       <p:nvGrpSpPr>
-        <p:cNvPr id="77" name="Shape 77"/>
+        <p:cNvPr id="76" name="Shape 76"/>
         <p:cNvGrpSpPr/>
         <p:nvPr/>
       </p:nvGrpSpPr>
@@ -1244,7 +1115,7 @@
       </p:grpSpPr>
       <p:sp>
         <p:nvSpPr>
-          <p:cNvPr id="78" name="Google Shape;78;g26ebb36c761_0_15:notes"/>
+          <p:cNvPr id="77" name="Google Shape;77;g26ebb36c761_0_15:notes"/>
           <p:cNvSpPr/>
           <p:nvPr>
             <p:ph idx="2" type="sldImg"/>
@@ -1279,7 +1150,7 @@
       </p:sp>
       <p:sp>
         <p:nvSpPr>
-          <p:cNvPr id="79" name="Google Shape;79;g26ebb36c761_0_15:notes"/>
+          <p:cNvPr id="78" name="Google Shape;78;g26ebb36c761_0_15:notes"/>
           <p:cNvSpPr txBox="1"/>
           <p:nvPr>
             <p:ph idx="1" type="body"/>
@@ -1329,7 +1200,7 @@
   <p:cSld>
     <p:spTree>
       <p:nvGrpSpPr>
-        <p:cNvPr id="88" name="Shape 88"/>
+        <p:cNvPr id="87" name="Shape 87"/>
         <p:cNvGrpSpPr/>
         <p:nvPr/>
       </p:nvGrpSpPr>
@@ -1343,7 +1214,7 @@
       </p:grpSpPr>
       <p:sp>
         <p:nvSpPr>
-          <p:cNvPr id="89" name="Google Shape;89;g26ebb36c761_0_20:notes"/>
+          <p:cNvPr id="88" name="Google Shape;88;g26ebb36c761_0_20:notes"/>
           <p:cNvSpPr/>
           <p:nvPr>
             <p:ph idx="2" type="sldImg"/>
@@ -1378,7 +1249,7 @@
       </p:sp>
       <p:sp>
         <p:nvSpPr>
-          <p:cNvPr id="90" name="Google Shape;90;g26ebb36c761_0_20:notes"/>
+          <p:cNvPr id="89" name="Google Shape;89;g26ebb36c761_0_20:notes"/>
           <p:cNvSpPr txBox="1"/>
           <p:nvPr>
             <p:ph idx="1" type="body"/>
@@ -1428,7 +1299,7 @@
   <p:cSld>
     <p:spTree>
       <p:nvGrpSpPr>
-        <p:cNvPr id="94" name="Shape 94"/>
+        <p:cNvPr id="93" name="Shape 93"/>
         <p:cNvGrpSpPr/>
         <p:nvPr/>
       </p:nvGrpSpPr>
@@ -1442,7 +1313,7 @@
       </p:grpSpPr>
       <p:sp>
         <p:nvSpPr>
-          <p:cNvPr id="95" name="Google Shape;95;g26ebb36c761_0_25:notes"/>
+          <p:cNvPr id="94" name="Google Shape;94;g26ebb36c761_0_25:notes"/>
           <p:cNvSpPr/>
           <p:nvPr>
             <p:ph idx="2" type="sldImg"/>
@@ -1477,7 +1348,7 @@
       </p:sp>
       <p:sp>
         <p:nvSpPr>
-          <p:cNvPr id="96" name="Google Shape;96;g26ebb36c761_0_25:notes"/>
+          <p:cNvPr id="95" name="Google Shape;95;g26ebb36c761_0_25:notes"/>
           <p:cNvSpPr txBox="1"/>
           <p:nvPr>
             <p:ph idx="1" type="body"/>
@@ -1527,7 +1398,7 @@
   <p:cSld>
     <p:spTree>
       <p:nvGrpSpPr>
-        <p:cNvPr id="100" name="Shape 100"/>
+        <p:cNvPr id="99" name="Shape 99"/>
         <p:cNvGrpSpPr/>
         <p:nvPr/>
       </p:nvGrpSpPr>
@@ -1541,7 +1412,7 @@
       </p:grpSpPr>
       <p:sp>
         <p:nvSpPr>
-          <p:cNvPr id="101" name="Google Shape;101;g2ceda6d9d92_0_0:notes"/>
+          <p:cNvPr id="100" name="Google Shape;100;g2ceda6d9d92_0_0:notes"/>
           <p:cNvSpPr/>
           <p:nvPr>
             <p:ph idx="2" type="sldImg"/>
@@ -1576,7 +1447,7 @@
       </p:sp>
       <p:sp>
         <p:nvSpPr>
-          <p:cNvPr id="102" name="Google Shape;102;g2ceda6d9d92_0_0:notes"/>
+          <p:cNvPr id="101" name="Google Shape;101;g2ceda6d9d92_0_0:notes"/>
           <p:cNvSpPr txBox="1"/>
           <p:nvPr>
             <p:ph idx="1" type="body"/>
@@ -6516,9 +6387,37 @@
           <a:chExt cx="0" cy="0"/>
         </a:xfrm>
       </p:grpSpPr>
+      <p:pic>
+        <p:nvPicPr>
+          <p:cNvPr id="60" name="Google Shape;60;p14"/>
+          <p:cNvPicPr preferRelativeResize="0"/>
+          <p:nvPr/>
+        </p:nvPicPr>
+        <p:blipFill>
+          <a:blip r:embed="rId3">
+            <a:alphaModFix/>
+          </a:blip>
+          <a:stretch>
+            <a:fillRect/>
+          </a:stretch>
+        </p:blipFill>
+        <p:spPr>
+          <a:xfrm>
+            <a:off x="0" y="833150"/>
+            <a:ext cx="9144001" cy="4310350"/>
+          </a:xfrm>
+          <a:prstGeom prst="rect">
+            <a:avLst/>
+          </a:prstGeom>
+          <a:noFill/>
+          <a:ln>
+            <a:noFill/>
+          </a:ln>
+        </p:spPr>
+      </p:pic>
       <p:sp>
         <p:nvSpPr>
-          <p:cNvPr id="60" name="Google Shape;60;p14"/>
+          <p:cNvPr id="61" name="Google Shape;61;p14"/>
           <p:cNvSpPr txBox="1"/>
           <p:nvPr>
             <p:ph type="title"/>
@@ -6557,32 +6456,6 @@
           </a:p>
         </p:txBody>
       </p:sp>
-      <p:cxnSp>
-        <p:nvCxnSpPr>
-          <p:cNvPr id="61" name="Google Shape;61;p14"/>
-          <p:cNvCxnSpPr/>
-          <p:nvPr/>
-        </p:nvCxnSpPr>
-        <p:spPr>
-          <a:xfrm>
-            <a:off x="4202425" y="486300"/>
-            <a:ext cx="408900" cy="129900"/>
-          </a:xfrm>
-          <a:prstGeom prst="straightConnector1">
-            <a:avLst/>
-          </a:prstGeom>
-          <a:noFill/>
-          <a:ln cap="flat" cmpd="sng" w="9525">
-            <a:solidFill>
-              <a:schemeClr val="dk2"/>
-            </a:solidFill>
-            <a:prstDash val="solid"/>
-            <a:round/>
-            <a:headEnd len="med" w="med" type="none"/>
-            <a:tailEnd len="med" w="med" type="triangle"/>
-          </a:ln>
-        </p:spPr>
-      </p:cxnSp>
       <p:sp>
         <p:nvSpPr>
           <p:cNvPr id="62" name="Google Shape;62;p14"/>
@@ -6591,7 +6464,7 @@
         </p:nvSpPr>
         <p:spPr>
           <a:xfrm>
-            <a:off x="1993125" y="206325"/>
+            <a:off x="5342900" y="374475"/>
             <a:ext cx="2154900" cy="338700"/>
           </a:xfrm>
           <a:prstGeom prst="rect">
@@ -6641,44 +6514,16 @@
           </a:p>
         </p:txBody>
       </p:sp>
-      <p:pic>
-        <p:nvPicPr>
-          <p:cNvPr id="63" name="Google Shape;63;p14"/>
-          <p:cNvPicPr preferRelativeResize="0"/>
-          <p:nvPr/>
-        </p:nvPicPr>
-        <p:blipFill>
-          <a:blip r:embed="rId3">
-            <a:alphaModFix/>
-          </a:blip>
-          <a:stretch>
-            <a:fillRect/>
-          </a:stretch>
-        </p:blipFill>
-        <p:spPr>
-          <a:xfrm>
-            <a:off x="188725" y="486300"/>
-            <a:ext cx="8436300" cy="4611649"/>
-          </a:xfrm>
-          <a:prstGeom prst="rect">
-            <a:avLst/>
-          </a:prstGeom>
-          <a:noFill/>
-          <a:ln>
-            <a:noFill/>
-          </a:ln>
-        </p:spPr>
-      </p:pic>
       <p:cxnSp>
         <p:nvCxnSpPr>
-          <p:cNvPr id="64" name="Google Shape;64;p14"/>
+          <p:cNvPr id="63" name="Google Shape;63;p14"/>
           <p:cNvCxnSpPr/>
           <p:nvPr/>
         </p:nvCxnSpPr>
         <p:spPr>
-          <a:xfrm>
-            <a:off x="3983275" y="427950"/>
-            <a:ext cx="493200" cy="246600"/>
+          <a:xfrm flipH="1">
+            <a:off x="5143625" y="648350"/>
+            <a:ext cx="248400" cy="248400"/>
           </a:xfrm>
           <a:prstGeom prst="straightConnector1">
             <a:avLst/>
@@ -6708,7 +6553,7 @@
   <p:cSld>
     <p:spTree>
       <p:nvGrpSpPr>
-        <p:cNvPr id="68" name="Shape 68"/>
+        <p:cNvPr id="67" name="Shape 67"/>
         <p:cNvGrpSpPr/>
         <p:nvPr/>
       </p:nvGrpSpPr>
@@ -6722,7 +6567,7 @@
       </p:grpSpPr>
       <p:sp>
         <p:nvSpPr>
-          <p:cNvPr id="69" name="Google Shape;69;p15"/>
+          <p:cNvPr id="68" name="Google Shape;68;p15"/>
           <p:cNvSpPr txBox="1"/>
           <p:nvPr>
             <p:ph type="title"/>
@@ -6762,7 +6607,7 @@
       </p:sp>
       <p:pic>
         <p:nvPicPr>
-          <p:cNvPr id="70" name="Google Shape;70;p15"/>
+          <p:cNvPr id="69" name="Google Shape;69;p15"/>
           <p:cNvPicPr preferRelativeResize="0"/>
           <p:nvPr/>
         </p:nvPicPr>
@@ -6801,7 +6646,7 @@
   <p:cSld>
     <p:spTree>
       <p:nvGrpSpPr>
-        <p:cNvPr id="74" name="Shape 74"/>
+        <p:cNvPr id="73" name="Shape 73"/>
         <p:cNvGrpSpPr/>
         <p:nvPr/>
       </p:nvGrpSpPr>
@@ -6815,7 +6660,7 @@
       </p:grpSpPr>
       <p:sp>
         <p:nvSpPr>
-          <p:cNvPr id="75" name="Google Shape;75;p16"/>
+          <p:cNvPr id="74" name="Google Shape;74;p16"/>
           <p:cNvSpPr txBox="1"/>
           <p:nvPr>
             <p:ph type="title"/>
@@ -6855,7 +6700,7 @@
       </p:sp>
       <p:sp>
         <p:nvSpPr>
-          <p:cNvPr id="76" name="Google Shape;76;p16"/>
+          <p:cNvPr id="75" name="Google Shape;75;p16"/>
           <p:cNvSpPr txBox="1"/>
           <p:nvPr>
             <p:ph idx="1" type="body"/>
@@ -6939,7 +6784,7 @@
   <p:cSld>
     <p:spTree>
       <p:nvGrpSpPr>
-        <p:cNvPr id="80" name="Shape 80"/>
+        <p:cNvPr id="79" name="Shape 79"/>
         <p:cNvGrpSpPr/>
         <p:nvPr/>
       </p:nvGrpSpPr>
@@ -6953,7 +6798,7 @@
       </p:grpSpPr>
       <p:sp>
         <p:nvSpPr>
-          <p:cNvPr id="81" name="Google Shape;81;p17"/>
+          <p:cNvPr id="80" name="Google Shape;80;p17"/>
           <p:cNvSpPr/>
           <p:nvPr/>
         </p:nvSpPr>
@@ -7007,7 +6852,7 @@
       </p:sp>
       <p:sp>
         <p:nvSpPr>
-          <p:cNvPr id="82" name="Google Shape;82;p17"/>
+          <p:cNvPr id="81" name="Google Shape;81;p17"/>
           <p:cNvSpPr/>
           <p:nvPr/>
         </p:nvSpPr>
@@ -7061,7 +6906,7 @@
       </p:sp>
       <p:sp>
         <p:nvSpPr>
-          <p:cNvPr id="83" name="Google Shape;83;p17"/>
+          <p:cNvPr id="82" name="Google Shape;82;p17"/>
           <p:cNvSpPr/>
           <p:nvPr/>
         </p:nvSpPr>
@@ -7115,7 +6960,7 @@
       </p:sp>
       <p:sp>
         <p:nvSpPr>
-          <p:cNvPr id="84" name="Google Shape;84;p17"/>
+          <p:cNvPr id="83" name="Google Shape;83;p17"/>
           <p:cNvSpPr txBox="1"/>
           <p:nvPr>
             <p:ph type="title"/>
@@ -7155,7 +7000,7 @@
       </p:sp>
       <p:sp>
         <p:nvSpPr>
-          <p:cNvPr id="85" name="Google Shape;85;p17"/>
+          <p:cNvPr id="84" name="Google Shape;84;p17"/>
           <p:cNvSpPr txBox="1"/>
           <p:nvPr>
             <p:ph idx="1" type="body"/>
@@ -7323,7 +7168,7 @@
       </p:sp>
       <p:sp>
         <p:nvSpPr>
-          <p:cNvPr id="86" name="Google Shape;86;p17"/>
+          <p:cNvPr id="85" name="Google Shape;85;p17"/>
           <p:cNvSpPr txBox="1"/>
           <p:nvPr>
             <p:ph idx="1" type="body"/>
@@ -7557,7 +7402,7 @@
       </p:sp>
       <p:sp>
         <p:nvSpPr>
-          <p:cNvPr id="87" name="Google Shape;87;p17"/>
+          <p:cNvPr id="86" name="Google Shape;86;p17"/>
           <p:cNvSpPr txBox="1"/>
           <p:nvPr>
             <p:ph idx="1" type="body"/>
@@ -7736,7 +7581,7 @@
   <p:cSld>
     <p:spTree>
       <p:nvGrpSpPr>
-        <p:cNvPr id="91" name="Shape 91"/>
+        <p:cNvPr id="90" name="Shape 90"/>
         <p:cNvGrpSpPr/>
         <p:nvPr/>
       </p:nvGrpSpPr>
@@ -7750,7 +7595,7 @@
       </p:grpSpPr>
       <p:sp>
         <p:nvSpPr>
-          <p:cNvPr id="92" name="Google Shape;92;p18"/>
+          <p:cNvPr id="91" name="Google Shape;91;p18"/>
           <p:cNvSpPr txBox="1"/>
           <p:nvPr>
             <p:ph type="title"/>
@@ -7790,7 +7635,7 @@
       </p:sp>
       <p:pic>
         <p:nvPicPr>
-          <p:cNvPr id="93" name="Google Shape;93;p18"/>
+          <p:cNvPr id="92" name="Google Shape;92;p18"/>
           <p:cNvPicPr preferRelativeResize="0"/>
           <p:nvPr/>
         </p:nvPicPr>
@@ -7829,7 +7674,7 @@
   <p:cSld>
     <p:spTree>
       <p:nvGrpSpPr>
-        <p:cNvPr id="97" name="Shape 97"/>
+        <p:cNvPr id="96" name="Shape 96"/>
         <p:cNvGrpSpPr/>
         <p:nvPr/>
       </p:nvGrpSpPr>
@@ -7843,7 +7688,7 @@
       </p:grpSpPr>
       <p:pic>
         <p:nvPicPr>
-          <p:cNvPr id="98" name="Google Shape;98;p19"/>
+          <p:cNvPr id="97" name="Google Shape;97;p19"/>
           <p:cNvPicPr preferRelativeResize="0"/>
           <p:nvPr/>
         </p:nvPicPr>
@@ -7871,7 +7716,7 @@
       </p:pic>
       <p:sp>
         <p:nvSpPr>
-          <p:cNvPr id="99" name="Google Shape;99;p19"/>
+          <p:cNvPr id="98" name="Google Shape;98;p19"/>
           <p:cNvSpPr txBox="1"/>
           <p:nvPr>
             <p:ph type="title"/>
@@ -7928,7 +7773,7 @@
   <p:cSld>
     <p:spTree>
       <p:nvGrpSpPr>
-        <p:cNvPr id="103" name="Shape 103"/>
+        <p:cNvPr id="102" name="Shape 102"/>
         <p:cNvGrpSpPr/>
         <p:nvPr/>
       </p:nvGrpSpPr>
@@ -7942,7 +7787,7 @@
       </p:grpSpPr>
       <p:sp>
         <p:nvSpPr>
-          <p:cNvPr id="104" name="Google Shape;104;p20"/>
+          <p:cNvPr id="103" name="Google Shape;103;p20"/>
           <p:cNvSpPr txBox="1"/>
           <p:nvPr>
             <p:ph type="title"/>

</xml_diff>